<commit_message>
add interviews and mockup to presentation
</commit_message>
<xml_diff>
--- a/documentation/Task1/PräsentationTask1SoED.pptx
+++ b/documentation/Task1/PräsentationTask1SoED.pptx
@@ -7,10 +7,12 @@
   <p:sldIdLst>
     <p:sldId id="256" r:id="rId2"/>
     <p:sldId id="257" r:id="rId3"/>
-    <p:sldId id="258" r:id="rId4"/>
-    <p:sldId id="259" r:id="rId5"/>
-    <p:sldId id="260" r:id="rId6"/>
-    <p:sldId id="261" r:id="rId7"/>
+    <p:sldId id="262" r:id="rId4"/>
+    <p:sldId id="258" r:id="rId5"/>
+    <p:sldId id="259" r:id="rId6"/>
+    <p:sldId id="260" r:id="rId7"/>
+    <p:sldId id="261" r:id="rId8"/>
+    <p:sldId id="265" r:id="rId9"/>
   </p:sldIdLst>
   <p:sldSz cx="12192000" cy="6858000"/>
   <p:notesSz cx="6858000" cy="9144000"/>
@@ -434,7 +436,7 @@
           <a:p>
             <a:fld id="{16894494-DE65-4F15-B2DF-6AABE3EF49DA}" type="slidenum">
               <a:rPr lang="de-CH" smtClean="0"/>
-              <a:t>‹Nr.›</a:t>
+              <a:t>‹#›</a:t>
             </a:fld>
             <a:endParaRPr lang="de-CH"/>
           </a:p>
@@ -772,7 +774,7 @@
           <a:p>
             <a:fld id="{16894494-DE65-4F15-B2DF-6AABE3EF49DA}" type="slidenum">
               <a:rPr lang="de-CH" smtClean="0"/>
-              <a:t>‹Nr.›</a:t>
+              <a:t>‹#›</a:t>
             </a:fld>
             <a:endParaRPr lang="de-CH"/>
           </a:p>
@@ -1173,7 +1175,7 @@
           <a:p>
             <a:fld id="{16894494-DE65-4F15-B2DF-6AABE3EF49DA}" type="slidenum">
               <a:rPr lang="de-CH" smtClean="0"/>
-              <a:t>‹Nr.›</a:t>
+              <a:t>‹#›</a:t>
             </a:fld>
             <a:endParaRPr lang="de-CH"/>
           </a:p>
@@ -1509,7 +1511,7 @@
           <a:p>
             <a:fld id="{16894494-DE65-4F15-B2DF-6AABE3EF49DA}" type="slidenum">
               <a:rPr lang="de-CH" smtClean="0"/>
-              <a:t>‹Nr.›</a:t>
+              <a:t>‹#›</a:t>
             </a:fld>
             <a:endParaRPr lang="de-CH"/>
           </a:p>
@@ -1829,7 +1831,7 @@
           <a:p>
             <a:fld id="{16894494-DE65-4F15-B2DF-6AABE3EF49DA}" type="slidenum">
               <a:rPr lang="de-CH" smtClean="0"/>
-              <a:t>‹Nr.›</a:t>
+              <a:t>‹#›</a:t>
             </a:fld>
             <a:endParaRPr lang="de-CH"/>
           </a:p>
@@ -2225,7 +2227,7 @@
           <a:p>
             <a:fld id="{16894494-DE65-4F15-B2DF-6AABE3EF49DA}" type="slidenum">
               <a:rPr lang="de-CH" smtClean="0"/>
-              <a:t>‹Nr.›</a:t>
+              <a:t>‹#›</a:t>
             </a:fld>
             <a:endParaRPr lang="de-CH"/>
           </a:p>
@@ -2477,7 +2479,7 @@
           <a:p>
             <a:fld id="{16894494-DE65-4F15-B2DF-6AABE3EF49DA}" type="slidenum">
               <a:rPr lang="de-CH" smtClean="0"/>
-              <a:t>‹Nr.›</a:t>
+              <a:t>‹#›</a:t>
             </a:fld>
             <a:endParaRPr lang="de-CH"/>
           </a:p>
@@ -2739,7 +2741,7 @@
           <a:p>
             <a:fld id="{16894494-DE65-4F15-B2DF-6AABE3EF49DA}" type="slidenum">
               <a:rPr lang="de-CH" smtClean="0"/>
-              <a:t>‹Nr.›</a:t>
+              <a:t>‹#›</a:t>
             </a:fld>
             <a:endParaRPr lang="de-CH"/>
           </a:p>
@@ -3001,7 +3003,7 @@
           <a:p>
             <a:fld id="{16894494-DE65-4F15-B2DF-6AABE3EF49DA}" type="slidenum">
               <a:rPr lang="de-CH" smtClean="0"/>
-              <a:t>‹Nr.›</a:t>
+              <a:t>‹#›</a:t>
             </a:fld>
             <a:endParaRPr lang="de-CH"/>
           </a:p>
@@ -3335,7 +3337,7 @@
           <a:p>
             <a:fld id="{16894494-DE65-4F15-B2DF-6AABE3EF49DA}" type="slidenum">
               <a:rPr lang="de-CH" smtClean="0"/>
-              <a:t>‹Nr.›</a:t>
+              <a:t>‹#›</a:t>
             </a:fld>
             <a:endParaRPr lang="de-CH"/>
           </a:p>
@@ -3658,7 +3660,7 @@
           <a:p>
             <a:fld id="{16894494-DE65-4F15-B2DF-6AABE3EF49DA}" type="slidenum">
               <a:rPr lang="de-CH" smtClean="0"/>
-              <a:t>‹Nr.›</a:t>
+              <a:t>‹#›</a:t>
             </a:fld>
             <a:endParaRPr lang="de-CH"/>
           </a:p>
@@ -4115,7 +4117,7 @@
           <a:p>
             <a:fld id="{16894494-DE65-4F15-B2DF-6AABE3EF49DA}" type="slidenum">
               <a:rPr lang="de-CH" smtClean="0"/>
-              <a:t>‹Nr.›</a:t>
+              <a:t>‹#›</a:t>
             </a:fld>
             <a:endParaRPr lang="de-CH"/>
           </a:p>
@@ -4315,7 +4317,7 @@
           <a:p>
             <a:fld id="{16894494-DE65-4F15-B2DF-6AABE3EF49DA}" type="slidenum">
               <a:rPr lang="de-CH" smtClean="0"/>
-              <a:t>‹Nr.›</a:t>
+              <a:t>‹#›</a:t>
             </a:fld>
             <a:endParaRPr lang="de-CH"/>
           </a:p>
@@ -4492,7 +4494,7 @@
           <a:p>
             <a:fld id="{16894494-DE65-4F15-B2DF-6AABE3EF49DA}" type="slidenum">
               <a:rPr lang="de-CH" smtClean="0"/>
-              <a:t>‹Nr.›</a:t>
+              <a:t>‹#›</a:t>
             </a:fld>
             <a:endParaRPr lang="de-CH"/>
           </a:p>
@@ -4825,7 +4827,7 @@
           <a:p>
             <a:fld id="{16894494-DE65-4F15-B2DF-6AABE3EF49DA}" type="slidenum">
               <a:rPr lang="de-CH" smtClean="0"/>
-              <a:t>‹Nr.›</a:t>
+              <a:t>‹#›</a:t>
             </a:fld>
             <a:endParaRPr lang="de-CH"/>
           </a:p>
@@ -5175,7 +5177,7 @@
           <a:p>
             <a:fld id="{16894494-DE65-4F15-B2DF-6AABE3EF49DA}" type="slidenum">
               <a:rPr lang="de-CH" smtClean="0"/>
-              <a:t>‹Nr.›</a:t>
+              <a:t>‹#›</a:t>
             </a:fld>
             <a:endParaRPr lang="de-CH"/>
           </a:p>
@@ -7239,7 +7241,7 @@
           <a:p>
             <a:fld id="{16894494-DE65-4F15-B2DF-6AABE3EF49DA}" type="slidenum">
               <a:rPr lang="de-CH" smtClean="0"/>
-              <a:t>‹Nr.›</a:t>
+              <a:t>‹#›</a:t>
             </a:fld>
             <a:endParaRPr lang="de-CH"/>
           </a:p>
@@ -7861,6 +7863,315 @@
       </p:grpSpPr>
       <p:sp>
         <p:nvSpPr>
+          <p:cNvPr id="2" name="Title 1">
+            <a:extLst>
+              <a:ext uri="{FF2B5EF4-FFF2-40B4-BE49-F238E27FC236}">
+                <a16:creationId xmlns:a16="http://schemas.microsoft.com/office/drawing/2014/main" id="{2003C012-5BCC-4DAE-99B3-FEFBF9A92CD3}"/>
+              </a:ext>
+            </a:extLst>
+          </p:cNvPr>
+          <p:cNvSpPr>
+            <a:spLocks noGrp="1"/>
+          </p:cNvSpPr>
+          <p:nvPr>
+            <p:ph type="title"/>
+          </p:nvPr>
+        </p:nvSpPr>
+        <p:spPr/>
+        <p:txBody>
+          <a:bodyPr/>
+          <a:lstStyle/>
+          <a:p>
+            <a:r>
+              <a:rPr lang="en-US" dirty="0" err="1"/>
+              <a:t>Ergebnisse</a:t>
+            </a:r>
+            <a:r>
+              <a:rPr lang="en-US" dirty="0"/>
+              <a:t> der Interviews</a:t>
+            </a:r>
+          </a:p>
+        </p:txBody>
+      </p:sp>
+      <p:sp>
+        <p:nvSpPr>
+          <p:cNvPr id="3" name="Content Placeholder 2">
+            <a:extLst>
+              <a:ext uri="{FF2B5EF4-FFF2-40B4-BE49-F238E27FC236}">
+                <a16:creationId xmlns:a16="http://schemas.microsoft.com/office/drawing/2014/main" id="{2A820CB6-F9DF-4B0F-A83E-C139119F7785}"/>
+              </a:ext>
+            </a:extLst>
+          </p:cNvPr>
+          <p:cNvSpPr>
+            <a:spLocks noGrp="1"/>
+          </p:cNvSpPr>
+          <p:nvPr>
+            <p:ph idx="1"/>
+          </p:nvPr>
+        </p:nvSpPr>
+        <p:spPr/>
+        <p:txBody>
+          <a:bodyPr vert="horz" lIns="91440" tIns="45720" rIns="91440" bIns="45720" rtlCol="0" anchor="t">
+            <a:normAutofit/>
+          </a:bodyPr>
+          <a:lstStyle/>
+          <a:p>
+            <a:r>
+              <a:rPr lang="en-US" dirty="0" err="1"/>
+              <a:t>Psychologiestudenten</a:t>
+            </a:r>
+            <a:r>
+              <a:rPr lang="en-US" dirty="0"/>
+              <a:t>, </a:t>
+            </a:r>
+            <a:r>
+              <a:rPr lang="en-US" dirty="0" err="1"/>
+              <a:t>Angehörige</a:t>
+            </a:r>
+            <a:r>
+              <a:rPr lang="en-US" dirty="0"/>
+              <a:t> und </a:t>
+            </a:r>
+            <a:r>
+              <a:rPr lang="en-US" dirty="0" err="1"/>
+              <a:t>Betroffene</a:t>
+            </a:r>
+          </a:p>
+          <a:p>
+            <a:r>
+              <a:rPr lang="en-US" dirty="0" err="1"/>
+              <a:t>Angehörige</a:t>
+            </a:r>
+            <a:r>
+              <a:rPr lang="en-US" dirty="0"/>
+              <a:t> </a:t>
+            </a:r>
+            <a:r>
+              <a:rPr lang="en-US" dirty="0" err="1"/>
+              <a:t>haben</a:t>
+            </a:r>
+            <a:r>
+              <a:rPr lang="en-US" dirty="0"/>
+              <a:t> </a:t>
+            </a:r>
+            <a:r>
+              <a:rPr lang="en-US" dirty="0" err="1"/>
+              <a:t>keine</a:t>
+            </a:r>
+            <a:r>
+              <a:rPr lang="en-US" dirty="0"/>
+              <a:t> </a:t>
+            </a:r>
+            <a:r>
+              <a:rPr lang="en-US" dirty="0" err="1"/>
+              <a:t>Pflichten</a:t>
+            </a:r>
+            <a:endParaRPr lang="en-US"/>
+          </a:p>
+          <a:p>
+            <a:pPr lvl="1"/>
+            <a:r>
+              <a:rPr lang="en-US" dirty="0" err="1"/>
+              <a:t>Kein</a:t>
+            </a:r>
+            <a:r>
+              <a:rPr lang="en-US" dirty="0"/>
+              <a:t> </a:t>
+            </a:r>
+            <a:r>
+              <a:rPr lang="en-US" dirty="0" err="1"/>
+              <a:t>Austausch</a:t>
+            </a:r>
+            <a:r>
+              <a:rPr lang="en-US" dirty="0"/>
+              <a:t> </a:t>
+            </a:r>
+            <a:r>
+              <a:rPr lang="en-US" dirty="0" err="1"/>
+              <a:t>mit</a:t>
+            </a:r>
+            <a:r>
+              <a:rPr lang="en-US" dirty="0"/>
+              <a:t> Arzt (</a:t>
+            </a:r>
+            <a:r>
+              <a:rPr lang="en-US" dirty="0" err="1"/>
+              <a:t>Ausnahme</a:t>
+            </a:r>
+            <a:r>
+              <a:rPr lang="en-US" dirty="0"/>
+              <a:t> </a:t>
+            </a:r>
+            <a:r>
+              <a:rPr lang="en-US" dirty="0" err="1"/>
+              <a:t>minderjährige</a:t>
+            </a:r>
+            <a:r>
+              <a:rPr lang="en-US" dirty="0"/>
+              <a:t>/</a:t>
+            </a:r>
+            <a:r>
+              <a:rPr lang="en-US" dirty="0" err="1"/>
+              <a:t>nicht</a:t>
+            </a:r>
+            <a:r>
+              <a:rPr lang="en-US" dirty="0"/>
+              <a:t> </a:t>
+            </a:r>
+            <a:r>
+              <a:rPr lang="en-US" dirty="0" err="1"/>
+              <a:t>mündige</a:t>
+            </a:r>
+            <a:r>
+              <a:rPr lang="en-US" dirty="0"/>
+              <a:t> </a:t>
+            </a:r>
+            <a:r>
+              <a:rPr lang="en-US" dirty="0" err="1"/>
+              <a:t>Patienten</a:t>
+            </a:r>
+            <a:r>
+              <a:rPr lang="en-US" dirty="0"/>
+              <a:t>)</a:t>
+            </a:r>
+          </a:p>
+          <a:p>
+            <a:r>
+              <a:rPr lang="en-US" dirty="0" err="1"/>
+              <a:t>Unterstützung</a:t>
+            </a:r>
+          </a:p>
+          <a:p>
+            <a:pPr lvl="1"/>
+            <a:r>
+              <a:rPr lang="en-US" dirty="0"/>
+              <a:t>Helfen, </a:t>
+            </a:r>
+            <a:r>
+              <a:rPr lang="en-US" dirty="0" err="1"/>
+              <a:t>kein</a:t>
+            </a:r>
+            <a:r>
+              <a:rPr lang="en-US" dirty="0"/>
+              <a:t> </a:t>
+            </a:r>
+            <a:r>
+              <a:rPr lang="en-US" dirty="0" err="1"/>
+              <a:t>Vermeidungsverhalten</a:t>
+            </a:r>
+            <a:r>
+              <a:rPr lang="en-US" dirty="0"/>
+              <a:t> </a:t>
+            </a:r>
+            <a:r>
+              <a:rPr lang="en-US" dirty="0" err="1"/>
+              <a:t>zu</a:t>
+            </a:r>
+            <a:r>
+              <a:rPr lang="en-US" dirty="0"/>
+              <a:t> </a:t>
+            </a:r>
+            <a:r>
+              <a:rPr lang="en-US" dirty="0" err="1"/>
+              <a:t>entwickeln</a:t>
+            </a:r>
+          </a:p>
+          <a:p>
+            <a:pPr lvl="1"/>
+            <a:r>
+              <a:rPr lang="en-US" dirty="0" err="1"/>
+              <a:t>Allgemein</a:t>
+            </a:r>
+            <a:r>
+              <a:rPr lang="en-US" dirty="0"/>
+              <a:t> </a:t>
+            </a:r>
+            <a:r>
+              <a:rPr lang="en-US" dirty="0" err="1"/>
+              <a:t>Unterstützung</a:t>
+            </a:r>
+            <a:r>
+              <a:rPr lang="en-US" dirty="0"/>
+              <a:t> und </a:t>
+            </a:r>
+            <a:r>
+              <a:rPr lang="en-US" dirty="0" err="1"/>
+              <a:t>Verständnis</a:t>
+            </a:r>
+            <a:r>
+              <a:rPr lang="en-US" dirty="0"/>
+              <a:t> </a:t>
+            </a:r>
+            <a:r>
+              <a:rPr lang="en-US" dirty="0" err="1"/>
+              <a:t>bieten</a:t>
+            </a:r>
+          </a:p>
+          <a:p>
+            <a:pPr lvl="1"/>
+            <a:r>
+              <a:rPr lang="en-US" dirty="0" err="1"/>
+              <a:t>sich</a:t>
+            </a:r>
+            <a:r>
+              <a:rPr lang="en-US" dirty="0"/>
+              <a:t> </a:t>
+            </a:r>
+            <a:r>
+              <a:rPr lang="en-US" dirty="0" err="1"/>
+              <a:t>informieren</a:t>
+            </a:r>
+            <a:r>
+              <a:rPr lang="en-US" dirty="0"/>
+              <a:t>, </a:t>
+            </a:r>
+            <a:r>
+              <a:rPr lang="en-US" dirty="0" err="1"/>
+              <a:t>nicht</a:t>
+            </a:r>
+            <a:r>
+              <a:rPr lang="en-US" dirty="0"/>
+              <a:t> </a:t>
+            </a:r>
+            <a:r>
+              <a:rPr lang="en-US" dirty="0" err="1"/>
+              <a:t>verurteilen</a:t>
+            </a:r>
+          </a:p>
+        </p:txBody>
+      </p:sp>
+    </p:spTree>
+    <p:extLst>
+      <p:ext uri="{BB962C8B-B14F-4D97-AF65-F5344CB8AC3E}">
+        <p14:creationId xmlns:p14="http://schemas.microsoft.com/office/powerpoint/2010/main" val="2063766417"/>
+      </p:ext>
+    </p:extLst>
+  </p:cSld>
+  <p:clrMapOvr>
+    <a:masterClrMapping/>
+  </p:clrMapOvr>
+</p:sld>
+</file>
+
+<file path=ppt/slides/slide4.xml><?xml version="1.0" encoding="utf-8"?>
+<p:sld xmlns:a="http://schemas.openxmlformats.org/drawingml/2006/main" xmlns:r="http://schemas.openxmlformats.org/officeDocument/2006/relationships" xmlns:p="http://schemas.openxmlformats.org/presentationml/2006/main">
+  <p:cSld>
+    <p:spTree>
+      <p:nvGrpSpPr>
+        <p:cNvPr id="1" name=""/>
+        <p:cNvGrpSpPr/>
+        <p:nvPr/>
+      </p:nvGrpSpPr>
+      <p:grpSpPr>
+        <a:xfrm>
+          <a:off x="0" y="0"/>
+          <a:ext cx="0" cy="0"/>
+          <a:chOff x="0" y="0"/>
+          <a:chExt cx="0" cy="0"/>
+        </a:xfrm>
+      </p:grpSpPr>
+      <p:sp>
+        <p:nvSpPr>
           <p:cNvPr id="2" name="Titel 1">
             <a:extLst>
               <a:ext uri="{FF2B5EF4-FFF2-40B4-BE49-F238E27FC236}">
@@ -7910,7 +8221,9 @@
           </a:xfrm>
         </p:spPr>
         <p:txBody>
-          <a:bodyPr/>
+          <a:bodyPr vert="horz" lIns="91440" tIns="45720" rIns="91440" bIns="45720" rtlCol="0" anchor="t">
+            <a:normAutofit/>
+          </a:bodyPr>
           <a:lstStyle/>
           <a:p>
             <a:r>
@@ -7921,7 +8234,7 @@
           <a:p>
             <a:r>
               <a:rPr lang="de-CH" dirty="0"/>
-              <a:t>Mitbewohnerin des Patienten</a:t>
+              <a:t>Mitbewohnerin und BFF des Patienten</a:t>
             </a:r>
           </a:p>
           <a:p>
@@ -8006,7 +8319,7 @@
 </p:sld>
 </file>
 
-<file path=ppt/slides/slide4.xml><?xml version="1.0" encoding="utf-8"?>
+<file path=ppt/slides/slide5.xml><?xml version="1.0" encoding="utf-8"?>
 <p:sld xmlns:a="http://schemas.openxmlformats.org/drawingml/2006/main" xmlns:r="http://schemas.openxmlformats.org/officeDocument/2006/relationships" xmlns:p="http://schemas.openxmlformats.org/presentationml/2006/main">
   <p:cSld>
     <p:spTree>
@@ -8148,7 +8461,7 @@
 </p:sld>
 </file>
 
-<file path=ppt/slides/slide5.xml><?xml version="1.0" encoding="utf-8"?>
+<file path=ppt/slides/slide6.xml><?xml version="1.0" encoding="utf-8"?>
 <p:sld xmlns:a="http://schemas.openxmlformats.org/drawingml/2006/main" xmlns:r="http://schemas.openxmlformats.org/officeDocument/2006/relationships" xmlns:p="http://schemas.openxmlformats.org/presentationml/2006/main">
   <p:cSld>
     <p:spTree>
@@ -8311,7 +8624,7 @@
 </p:sld>
 </file>
 
-<file path=ppt/slides/slide6.xml><?xml version="1.0" encoding="utf-8"?>
+<file path=ppt/slides/slide7.xml><?xml version="1.0" encoding="utf-8"?>
 <p:sld xmlns:a="http://schemas.openxmlformats.org/drawingml/2006/main" xmlns:r="http://schemas.openxmlformats.org/officeDocument/2006/relationships" xmlns:p="http://schemas.openxmlformats.org/presentationml/2006/main">
   <p:cSld>
     <p:spTree>
@@ -9050,6 +9363,100 @@
 </p:sld>
 </file>
 
+<file path=ppt/slides/slide8.xml><?xml version="1.0" encoding="utf-8"?>
+<p:sld xmlns:a="http://schemas.openxmlformats.org/drawingml/2006/main" xmlns:r="http://schemas.openxmlformats.org/officeDocument/2006/relationships" xmlns:p="http://schemas.openxmlformats.org/presentationml/2006/main">
+  <p:cSld>
+    <p:spTree>
+      <p:nvGrpSpPr>
+        <p:cNvPr id="1" name=""/>
+        <p:cNvGrpSpPr/>
+        <p:nvPr/>
+      </p:nvGrpSpPr>
+      <p:grpSpPr>
+        <a:xfrm>
+          <a:off x="0" y="0"/>
+          <a:ext cx="0" cy="0"/>
+          <a:chOff x="0" y="0"/>
+          <a:chExt cx="0" cy="0"/>
+        </a:xfrm>
+      </p:grpSpPr>
+      <p:sp>
+        <p:nvSpPr>
+          <p:cNvPr id="2" name="Title 1">
+            <a:extLst>
+              <a:ext uri="{FF2B5EF4-FFF2-40B4-BE49-F238E27FC236}">
+                <a16:creationId xmlns:a16="http://schemas.microsoft.com/office/drawing/2014/main" id="{1FB5134E-39DB-44D4-B7F8-E2C70D4576F5}"/>
+              </a:ext>
+            </a:extLst>
+          </p:cNvPr>
+          <p:cNvSpPr>
+            <a:spLocks noGrp="1"/>
+          </p:cNvSpPr>
+          <p:nvPr>
+            <p:ph type="title"/>
+          </p:nvPr>
+        </p:nvSpPr>
+        <p:spPr/>
+        <p:txBody>
+          <a:bodyPr/>
+          <a:lstStyle/>
+          <a:p>
+            <a:r>
+              <a:rPr lang="en-US" dirty="0" err="1"/>
+              <a:t>Prototyp</a:t>
+            </a:r>
+          </a:p>
+        </p:txBody>
+      </p:sp>
+      <p:sp>
+        <p:nvSpPr>
+          <p:cNvPr id="3" name="Content Placeholder 2">
+            <a:extLst>
+              <a:ext uri="{FF2B5EF4-FFF2-40B4-BE49-F238E27FC236}">
+                <a16:creationId xmlns:a16="http://schemas.microsoft.com/office/drawing/2014/main" id="{B83A6C65-9F05-4491-B116-D62DB5302B12}"/>
+              </a:ext>
+            </a:extLst>
+          </p:cNvPr>
+          <p:cNvSpPr>
+            <a:spLocks noGrp="1"/>
+          </p:cNvSpPr>
+          <p:nvPr>
+            <p:ph idx="1"/>
+          </p:nvPr>
+        </p:nvSpPr>
+        <p:spPr/>
+        <p:txBody>
+          <a:bodyPr vert="horz" lIns="91440" tIns="45720" rIns="91440" bIns="45720" rtlCol="0" anchor="t">
+            <a:normAutofit/>
+          </a:bodyPr>
+          <a:lstStyle/>
+          <a:p>
+            <a:r>
+              <a:rPr lang="en-US" dirty="0">
+                <a:hlinkClick r:id="rId2"/>
+              </a:rPr>
+              <a:t>https://app.moqups.com/AJh2AG04YE/view</a:t>
+            </a:r>
+            <a:endParaRPr lang="en-US"/>
+          </a:p>
+          <a:p>
+            <a:endParaRPr lang="en-US" dirty="0"/>
+          </a:p>
+        </p:txBody>
+      </p:sp>
+    </p:spTree>
+    <p:extLst>
+      <p:ext uri="{BB962C8B-B14F-4D97-AF65-F5344CB8AC3E}">
+        <p14:creationId xmlns:p14="http://schemas.microsoft.com/office/powerpoint/2010/main" val="1929453956"/>
+      </p:ext>
+    </p:extLst>
+  </p:cSld>
+  <p:clrMapOvr>
+    <a:masterClrMapping/>
+  </p:clrMapOvr>
+</p:sld>
+</file>
+
 <file path=ppt/theme/theme1.xml><?xml version="1.0" encoding="utf-8"?>
 <a:theme xmlns:a="http://schemas.openxmlformats.org/drawingml/2006/main" name="Fetzen">
   <a:themeElements>

</xml_diff>